<commit_message>
Update Python Lesson 3 Functions.pptx
</commit_message>
<xml_diff>
--- a/Python Lesson 3 Functions.pptx
+++ b/Python Lesson 3 Functions.pptx
@@ -5,7 +5,7 @@
     <p:sldMasterId id="2147483840" r:id="rId1"/>
   </p:sldMasterIdLst>
   <p:notesMasterIdLst>
-    <p:notesMasterId r:id="rId28"/>
+    <p:notesMasterId r:id="rId29"/>
   </p:notesMasterIdLst>
   <p:sldIdLst>
     <p:sldId id="256" r:id="rId2"/>
@@ -29,11 +29,12 @@
     <p:sldId id="259" r:id="rId20"/>
     <p:sldId id="279" r:id="rId21"/>
     <p:sldId id="282" r:id="rId22"/>
-    <p:sldId id="283" r:id="rId23"/>
-    <p:sldId id="288" r:id="rId24"/>
-    <p:sldId id="285" r:id="rId25"/>
-    <p:sldId id="289" r:id="rId26"/>
-    <p:sldId id="284" r:id="rId27"/>
+    <p:sldId id="290" r:id="rId23"/>
+    <p:sldId id="283" r:id="rId24"/>
+    <p:sldId id="288" r:id="rId25"/>
+    <p:sldId id="285" r:id="rId26"/>
+    <p:sldId id="289" r:id="rId27"/>
+    <p:sldId id="284" r:id="rId28"/>
   </p:sldIdLst>
   <p:sldSz cx="12192000" cy="6858000"/>
   <p:notesSz cx="6858000" cy="9144000"/>
@@ -34971,7 +34972,7 @@
           <a:p>
             <a:fld id="{441504DD-C298-447F-98F0-B2DFACE9D49B}" type="datetimeFigureOut">
               <a:rPr lang="en-US" smtClean="0"/>
-              <a:t>10/24/2018</a:t>
+              <a:t>10/27/2018</a:t>
             </a:fld>
             <a:endParaRPr lang="en-US"/>
           </a:p>
@@ -35575,7 +35576,7 @@
           <a:p>
             <a:fld id="{78F5BFE6-0963-439F-9E10-8F8FD19B22BF}" type="slidenum">
               <a:rPr lang="en-US" smtClean="0"/>
-              <a:t>23</a:t>
+              <a:t>24</a:t>
             </a:fld>
             <a:endParaRPr lang="en-US"/>
           </a:p>
@@ -36542,7 +36543,7 @@
           <a:p>
             <a:fld id="{A76EB9D5-7E1A-4433-8B21-2237CC26FA2C}" type="datetimeFigureOut">
               <a:rPr lang="en-US" smtClean="0"/>
-              <a:t>10/24/2018</a:t>
+              <a:t>10/27/2018</a:t>
             </a:fld>
             <a:endParaRPr lang="en-US" dirty="0"/>
           </a:p>
@@ -36713,7 +36714,7 @@
           <a:p>
             <a:fld id="{62598A19-B9D6-4696-A74D-9FEF900C8B6A}" type="datetimeFigureOut">
               <a:rPr lang="en-US" smtClean="0"/>
-              <a:t>10/24/2018</a:t>
+              <a:t>10/27/2018</a:t>
             </a:fld>
             <a:endParaRPr lang="en-US" dirty="0"/>
           </a:p>
@@ -36893,7 +36894,7 @@
           <a:p>
             <a:fld id="{9A205100-39B0-4914-BBD6-34F267582565}" type="datetimeFigureOut">
               <a:rPr lang="en-US" smtClean="0"/>
-              <a:t>10/24/2018</a:t>
+              <a:t>10/27/2018</a:t>
             </a:fld>
             <a:endParaRPr lang="en-US" dirty="0"/>
           </a:p>
@@ -37063,7 +37064,7 @@
           <a:p>
             <a:fld id="{539EF837-FEDB-44F2-8FB5-4F56FC548A33}" type="datetimeFigureOut">
               <a:rPr lang="en-US" smtClean="0"/>
-              <a:t>10/24/2018</a:t>
+              <a:t>10/27/2018</a:t>
             </a:fld>
             <a:endParaRPr lang="en-US" dirty="0"/>
           </a:p>
@@ -37331,7 +37332,7 @@
           <a:p>
             <a:fld id="{4EC2AB55-62C0-407E-B706-C907B44B0BFC}" type="datetimeFigureOut">
               <a:rPr lang="en-US" smtClean="0"/>
-              <a:t>10/24/2018</a:t>
+              <a:t>10/27/2018</a:t>
             </a:fld>
             <a:endParaRPr lang="en-US" dirty="0"/>
           </a:p>
@@ -37563,7 +37564,7 @@
           <a:p>
             <a:fld id="{69FBB33F-FEF5-4E73-A5F9-307689FE77C6}" type="datetimeFigureOut">
               <a:rPr lang="en-US" smtClean="0"/>
-              <a:t>10/24/2018</a:t>
+              <a:t>10/27/2018</a:t>
             </a:fld>
             <a:endParaRPr lang="en-US" dirty="0"/>
           </a:p>
@@ -37918,7 +37919,7 @@
           <a:p>
             <a:fld id="{A64B5FA4-F0B8-4D71-BC92-932E3A1502F8}" type="datetimeFigureOut">
               <a:rPr lang="en-US" smtClean="0"/>
-              <a:t>10/24/2018</a:t>
+              <a:t>10/27/2018</a:t>
             </a:fld>
             <a:endParaRPr lang="en-US" dirty="0"/>
           </a:p>
@@ -38059,7 +38060,7 @@
           <a:p>
             <a:fld id="{4FD89F80-C2CE-4D6A-80E4-D3515AD92BC6}" type="datetimeFigureOut">
               <a:rPr lang="en-US" smtClean="0"/>
-              <a:t>10/24/2018</a:t>
+              <a:t>10/27/2018</a:t>
             </a:fld>
             <a:endParaRPr lang="en-US" dirty="0"/>
           </a:p>
@@ -38154,7 +38155,7 @@
           <a:p>
             <a:fld id="{03E4220E-EF40-477E-B84C-637FC7CE78DB}" type="datetimeFigureOut">
               <a:rPr lang="en-US" smtClean="0"/>
-              <a:t>10/24/2018</a:t>
+              <a:t>10/27/2018</a:t>
             </a:fld>
             <a:endParaRPr lang="en-US" dirty="0"/>
           </a:p>
@@ -38511,7 +38512,7 @@
           <a:p>
             <a:fld id="{FD0B8D63-E026-4E54-B301-C824E1BD14F3}" type="datetimeFigureOut">
               <a:rPr lang="en-US" smtClean="0"/>
-              <a:t>10/24/2018</a:t>
+              <a:t>10/27/2018</a:t>
             </a:fld>
             <a:endParaRPr lang="en-US" dirty="0"/>
           </a:p>
@@ -38868,7 +38869,7 @@
           <a:p>
             <a:fld id="{6C423185-9573-406A-8068-0AB4F2335019}" type="datetimeFigureOut">
               <a:rPr lang="en-US" smtClean="0"/>
-              <a:t>10/24/2018</a:t>
+              <a:t>10/27/2018</a:t>
             </a:fld>
             <a:endParaRPr lang="en-US" dirty="0"/>
           </a:p>
@@ -39108,7 +39109,7 @@
           <a:p>
             <a:fld id="{6C5516DA-9D86-4E1E-A623-C11F9F74EB59}" type="datetimeFigureOut">
               <a:rPr lang="en-US" smtClean="0"/>
-              <a:t>10/24/2018</a:t>
+              <a:t>10/27/2018</a:t>
             </a:fld>
             <a:endParaRPr lang="en-US" dirty="0"/>
           </a:p>
@@ -41048,6 +41049,90 @@
           <p:cNvPr id="2" name="Title 1">
             <a:extLst>
               <a:ext uri="{FF2B5EF4-FFF2-40B4-BE49-F238E27FC236}">
+                <a16:creationId xmlns:a16="http://schemas.microsoft.com/office/drawing/2014/main" id="{E8AC6B12-BC7D-4099-A3BF-14B0ED384E2D}"/>
+              </a:ext>
+            </a:extLst>
+          </p:cNvPr>
+          <p:cNvSpPr>
+            <a:spLocks noGrp="1"/>
+          </p:cNvSpPr>
+          <p:nvPr>
+            <p:ph type="title"/>
+          </p:nvPr>
+        </p:nvSpPr>
+        <p:spPr/>
+        <p:txBody>
+          <a:bodyPr/>
+          <a:lstStyle/>
+          <a:p>
+            <a:r>
+              <a:rPr lang="en-US"/>
+              <a:t>scope</a:t>
+            </a:r>
+            <a:endParaRPr lang="en-US" dirty="0"/>
+          </a:p>
+        </p:txBody>
+      </p:sp>
+      <p:sp>
+        <p:nvSpPr>
+          <p:cNvPr id="3" name="Text Placeholder 2">
+            <a:extLst>
+              <a:ext uri="{FF2B5EF4-FFF2-40B4-BE49-F238E27FC236}">
+                <a16:creationId xmlns:a16="http://schemas.microsoft.com/office/drawing/2014/main" id="{C88B7925-7548-4BD0-AF70-03FC6E7C245E}"/>
+              </a:ext>
+            </a:extLst>
+          </p:cNvPr>
+          <p:cNvSpPr>
+            <a:spLocks noGrp="1"/>
+          </p:cNvSpPr>
+          <p:nvPr>
+            <p:ph type="body" idx="1"/>
+          </p:nvPr>
+        </p:nvSpPr>
+        <p:spPr/>
+        <p:txBody>
+          <a:bodyPr/>
+          <a:lstStyle/>
+          <a:p>
+            <a:endParaRPr lang="en-US"/>
+          </a:p>
+        </p:txBody>
+      </p:sp>
+    </p:spTree>
+    <p:extLst>
+      <p:ext uri="{BB962C8B-B14F-4D97-AF65-F5344CB8AC3E}">
+        <p14:creationId xmlns:p14="http://schemas.microsoft.com/office/powerpoint/2010/main" val="1679631250"/>
+      </p:ext>
+    </p:extLst>
+  </p:cSld>
+  <p:clrMapOvr>
+    <a:masterClrMapping/>
+  </p:clrMapOvr>
+</p:sld>
+</file>
+
+<file path=ppt/slides/slide23.xml><?xml version="1.0" encoding="utf-8"?>
+<p:sld xmlns:a="http://schemas.openxmlformats.org/drawingml/2006/main" xmlns:r="http://schemas.openxmlformats.org/officeDocument/2006/relationships" xmlns:p="http://schemas.openxmlformats.org/presentationml/2006/main">
+  <p:cSld>
+    <p:spTree>
+      <p:nvGrpSpPr>
+        <p:cNvPr id="1" name=""/>
+        <p:cNvGrpSpPr/>
+        <p:nvPr/>
+      </p:nvGrpSpPr>
+      <p:grpSpPr>
+        <a:xfrm>
+          <a:off x="0" y="0"/>
+          <a:ext cx="0" cy="0"/>
+          <a:chOff x="0" y="0"/>
+          <a:chExt cx="0" cy="0"/>
+        </a:xfrm>
+      </p:grpSpPr>
+      <p:sp>
+        <p:nvSpPr>
+          <p:cNvPr id="2" name="Title 1">
+            <a:extLst>
+              <a:ext uri="{FF2B5EF4-FFF2-40B4-BE49-F238E27FC236}">
                 <a16:creationId xmlns:a16="http://schemas.microsoft.com/office/drawing/2014/main" id="{5D142F53-76EF-48B0-8805-E1E81B2B425D}"/>
               </a:ext>
             </a:extLst>
@@ -41110,7 +41195,7 @@
 </p:sld>
 </file>
 
-<file path=ppt/slides/slide23.xml><?xml version="1.0" encoding="utf-8"?>
+<file path=ppt/slides/slide24.xml><?xml version="1.0" encoding="utf-8"?>
 <p:sld xmlns:a="http://schemas.openxmlformats.org/drawingml/2006/main" xmlns:r="http://schemas.openxmlformats.org/officeDocument/2006/relationships" xmlns:p="http://schemas.openxmlformats.org/presentationml/2006/main">
   <p:cSld>
     <p:bg>
@@ -41210,7 +41295,7 @@
 </p:sld>
 </file>
 
-<file path=ppt/slides/slide24.xml><?xml version="1.0" encoding="utf-8"?>
+<file path=ppt/slides/slide25.xml><?xml version="1.0" encoding="utf-8"?>
 <p:sld xmlns:a="http://schemas.openxmlformats.org/drawingml/2006/main" xmlns:r="http://schemas.openxmlformats.org/officeDocument/2006/relationships" xmlns:p="http://schemas.openxmlformats.org/presentationml/2006/main">
   <p:cSld>
     <p:spTree>
@@ -41293,7 +41378,7 @@
 </p:sld>
 </file>
 
-<file path=ppt/slides/slide25.xml><?xml version="1.0" encoding="utf-8"?>
+<file path=ppt/slides/slide26.xml><?xml version="1.0" encoding="utf-8"?>
 <p:sld xmlns:a="http://schemas.openxmlformats.org/drawingml/2006/main" xmlns:r="http://schemas.openxmlformats.org/officeDocument/2006/relationships" xmlns:p="http://schemas.openxmlformats.org/presentationml/2006/main">
   <p:cSld>
     <p:bg>
@@ -41397,7 +41482,7 @@
 </p:sld>
 </file>
 
-<file path=ppt/slides/slide26.xml><?xml version="1.0" encoding="utf-8"?>
+<file path=ppt/slides/slide27.xml><?xml version="1.0" encoding="utf-8"?>
 <p:sld xmlns:a="http://schemas.openxmlformats.org/drawingml/2006/main" xmlns:r="http://schemas.openxmlformats.org/officeDocument/2006/relationships" xmlns:p="http://schemas.openxmlformats.org/presentationml/2006/main">
   <p:cSld>
     <p:bg>

</xml_diff>